<commit_message>
add pics in ppt
</commit_message>
<xml_diff>
--- a/async in js.pptx
+++ b/async in js.pptx
@@ -112,7 +112,27 @@
       </a:defRPr>
     </a:lvl9pPr>
   </p:defaultTextStyle>
+  <p:extLst>
+    <p:ext uri="{EFAFB233-063F-42B5-8137-9DF3F51BA10A}">
+      <p15:sldGuideLst xmlns:p15="http://schemas.microsoft.com/office/powerpoint/2012/main">
+        <p15:guide id="1" orient="horz" pos="2160">
+          <p15:clr>
+            <a:srgbClr val="A4A3A4"/>
+          </p15:clr>
+        </p15:guide>
+        <p15:guide id="2" pos="2880">
+          <p15:clr>
+            <a:srgbClr val="A4A3A4"/>
+          </p15:clr>
+        </p15:guide>
+      </p15:sldGuideLst>
+    </p:ext>
+  </p:extLst>
 </p:presentation>
+</file>
+
+<file path=ppt/revisionInfo.xml><?xml version="1.0" encoding="utf-8"?>
+<p1510:revInfo xmlns:a="http://schemas.openxmlformats.org/drawingml/2006/main" xmlns:r="http://schemas.openxmlformats.org/officeDocument/2006/relationships" xmlns:p1510="http://schemas.microsoft.com/office/powerpoint/2015/10/main"/>
 </file>
 
 <file path=ppt/slideLayouts/slideLayout1.xml><?xml version="1.0" encoding="utf-8"?>
@@ -175,9 +195,7 @@
         </p:style>
         <p:txBody>
           <a:bodyPr rtlCol="0" anchor="ctr"/>
-          <a:lstStyle>
-            <a:extLst/>
-          </a:lstStyle>
+          <a:lstStyle/>
           <a:p>
             <a:pPr algn="ctr" eaLnBrk="1" latinLnBrk="0" hangingPunct="1"/>
             <a:endParaRPr kumimoji="0" lang="en-US"/>
@@ -221,7 +239,7 @@
           </a:lstStyle>
           <a:p>
             <a:r>
-              <a:rPr kumimoji="0" lang="zh-CN" altLang="en-US" smtClean="0"/>
+              <a:rPr kumimoji="0" lang="zh-CN" altLang="en-US"/>
               <a:t>单击此处编辑母版标题样式</a:t>
             </a:r>
             <a:endParaRPr kumimoji="0" lang="en-US"/>
@@ -339,7 +357,7 @@
           </a:lstStyle>
           <a:p>
             <a:r>
-              <a:rPr kumimoji="0" lang="zh-CN" altLang="en-US" smtClean="0"/>
+              <a:rPr kumimoji="0" lang="zh-CN" altLang="en-US"/>
               <a:t>单击此处编辑母版副标题样式</a:t>
             </a:r>
             <a:endParaRPr kumimoji="0" lang="en-US"/>
@@ -364,7 +382,7 @@
             <a:fld id="{530820CF-B880-4189-942D-D702A7CBA730}" type="datetimeFigureOut">
               <a:rPr lang="zh-CN" altLang="en-US" smtClean="0"/>
               <a:pPr/>
-              <a:t>2018/6/24</a:t>
+              <a:t>2018/6/25</a:t>
             </a:fld>
             <a:endParaRPr lang="zh-CN" altLang="en-US"/>
           </a:p>
@@ -458,9 +476,7 @@
         </p:style>
         <p:txBody>
           <a:bodyPr rtlCol="0" anchor="ctr"/>
-          <a:lstStyle>
-            <a:extLst/>
-          </a:lstStyle>
+          <a:lstStyle/>
           <a:p>
             <a:pPr algn="ctr" eaLnBrk="1" latinLnBrk="0" hangingPunct="1"/>
             <a:endParaRPr kumimoji="0" lang="en-US"/>
@@ -505,12 +521,10 @@
         <p:spPr/>
         <p:txBody>
           <a:bodyPr/>
-          <a:lstStyle>
-            <a:extLst/>
-          </a:lstStyle>
-          <a:p>
-            <a:r>
-              <a:rPr kumimoji="0" lang="zh-CN" altLang="en-US" smtClean="0"/>
+          <a:lstStyle/>
+          <a:p>
+            <a:r>
+              <a:rPr kumimoji="0" lang="zh-CN" altLang="en-US"/>
               <a:t>单击此处编辑母版标题样式</a:t>
             </a:r>
             <a:endParaRPr kumimoji="0" lang="en-US"/>
@@ -530,41 +544,39 @@
         <p:spPr/>
         <p:txBody>
           <a:bodyPr vert="eaVert"/>
-          <a:lstStyle>
-            <a:extLst/>
-          </a:lstStyle>
+          <a:lstStyle/>
           <a:p>
             <a:pPr lvl="0" eaLnBrk="1" latinLnBrk="0" hangingPunct="1"/>
             <a:r>
-              <a:rPr lang="zh-CN" altLang="en-US" smtClean="0"/>
+              <a:rPr lang="zh-CN" altLang="en-US"/>
               <a:t>单击此处编辑母版文本样式</a:t>
             </a:r>
           </a:p>
           <a:p>
             <a:pPr lvl="1" eaLnBrk="1" latinLnBrk="0" hangingPunct="1"/>
             <a:r>
-              <a:rPr lang="zh-CN" altLang="en-US" smtClean="0"/>
+              <a:rPr lang="zh-CN" altLang="en-US"/>
               <a:t>第二级</a:t>
             </a:r>
           </a:p>
           <a:p>
             <a:pPr lvl="2" eaLnBrk="1" latinLnBrk="0" hangingPunct="1"/>
             <a:r>
-              <a:rPr lang="zh-CN" altLang="en-US" smtClean="0"/>
+              <a:rPr lang="zh-CN" altLang="en-US"/>
               <a:t>第三级</a:t>
             </a:r>
           </a:p>
           <a:p>
             <a:pPr lvl="3" eaLnBrk="1" latinLnBrk="0" hangingPunct="1"/>
             <a:r>
-              <a:rPr lang="zh-CN" altLang="en-US" smtClean="0"/>
+              <a:rPr lang="zh-CN" altLang="en-US"/>
               <a:t>第四级</a:t>
             </a:r>
           </a:p>
           <a:p>
             <a:pPr lvl="4" eaLnBrk="1" latinLnBrk="0" hangingPunct="1"/>
             <a:r>
-              <a:rPr lang="zh-CN" altLang="en-US" smtClean="0"/>
+              <a:rPr lang="zh-CN" altLang="en-US"/>
               <a:t>第五级</a:t>
             </a:r>
             <a:endParaRPr kumimoji="0" lang="en-US"/>
@@ -589,7 +601,7 @@
             <a:fld id="{530820CF-B880-4189-942D-D702A7CBA730}" type="datetimeFigureOut">
               <a:rPr lang="zh-CN" altLang="en-US" smtClean="0"/>
               <a:pPr/>
-              <a:t>2018/6/24</a:t>
+              <a:t>2018/6/25</a:t>
             </a:fld>
             <a:endParaRPr lang="zh-CN" altLang="en-US"/>
           </a:p>
@@ -708,9 +720,7 @@
         </p:style>
         <p:txBody>
           <a:bodyPr rtlCol="0" anchor="ctr"/>
-          <a:lstStyle>
-            <a:extLst/>
-          </a:lstStyle>
+          <a:lstStyle/>
           <a:p>
             <a:pPr algn="ctr" eaLnBrk="1" latinLnBrk="0" hangingPunct="1"/>
             <a:endParaRPr kumimoji="0" lang="en-US"/>
@@ -755,9 +765,7 @@
         </p:style>
         <p:txBody>
           <a:bodyPr rtlCol="0" anchor="ctr"/>
-          <a:lstStyle>
-            <a:extLst/>
-          </a:lstStyle>
+          <a:lstStyle/>
           <a:p>
             <a:pPr algn="ctr" eaLnBrk="1" latinLnBrk="0" hangingPunct="1"/>
             <a:endParaRPr kumimoji="0" lang="en-US"/>
@@ -782,12 +790,10 @@
         </p:spPr>
         <p:txBody>
           <a:bodyPr vert="eaVert"/>
-          <a:lstStyle>
-            <a:extLst/>
-          </a:lstStyle>
-          <a:p>
-            <a:r>
-              <a:rPr kumimoji="0" lang="zh-CN" altLang="en-US" smtClean="0"/>
+          <a:lstStyle/>
+          <a:p>
+            <a:r>
+              <a:rPr kumimoji="0" lang="zh-CN" altLang="en-US"/>
               <a:t>单击此处编辑母版标题样式</a:t>
             </a:r>
             <a:endParaRPr kumimoji="0" lang="en-US"/>
@@ -812,41 +818,39 @@
         </p:spPr>
         <p:txBody>
           <a:bodyPr vert="eaVert"/>
-          <a:lstStyle>
-            <a:extLst/>
-          </a:lstStyle>
+          <a:lstStyle/>
           <a:p>
             <a:pPr lvl="0" eaLnBrk="1" latinLnBrk="0" hangingPunct="1"/>
             <a:r>
-              <a:rPr lang="zh-CN" altLang="en-US" smtClean="0"/>
+              <a:rPr lang="zh-CN" altLang="en-US"/>
               <a:t>单击此处编辑母版文本样式</a:t>
             </a:r>
           </a:p>
           <a:p>
             <a:pPr lvl="1" eaLnBrk="1" latinLnBrk="0" hangingPunct="1"/>
             <a:r>
-              <a:rPr lang="zh-CN" altLang="en-US" smtClean="0"/>
+              <a:rPr lang="zh-CN" altLang="en-US"/>
               <a:t>第二级</a:t>
             </a:r>
           </a:p>
           <a:p>
             <a:pPr lvl="2" eaLnBrk="1" latinLnBrk="0" hangingPunct="1"/>
             <a:r>
-              <a:rPr lang="zh-CN" altLang="en-US" smtClean="0"/>
+              <a:rPr lang="zh-CN" altLang="en-US"/>
               <a:t>第三级</a:t>
             </a:r>
           </a:p>
           <a:p>
             <a:pPr lvl="3" eaLnBrk="1" latinLnBrk="0" hangingPunct="1"/>
             <a:r>
-              <a:rPr lang="zh-CN" altLang="en-US" smtClean="0"/>
+              <a:rPr lang="zh-CN" altLang="en-US"/>
               <a:t>第四级</a:t>
             </a:r>
           </a:p>
           <a:p>
             <a:pPr lvl="4" eaLnBrk="1" latinLnBrk="0" hangingPunct="1"/>
             <a:r>
-              <a:rPr lang="zh-CN" altLang="en-US" smtClean="0"/>
+              <a:rPr lang="zh-CN" altLang="en-US"/>
               <a:t>第五级</a:t>
             </a:r>
             <a:endParaRPr kumimoji="0" lang="en-US"/>
@@ -871,7 +875,7 @@
             <a:fld id="{530820CF-B880-4189-942D-D702A7CBA730}" type="datetimeFigureOut">
               <a:rPr lang="zh-CN" altLang="en-US" smtClean="0"/>
               <a:pPr/>
-              <a:t>2018/6/24</a:t>
+              <a:t>2018/6/25</a:t>
             </a:fld>
             <a:endParaRPr lang="zh-CN" altLang="en-US"/>
           </a:p>
@@ -968,12 +972,10 @@
         </p:spPr>
         <p:txBody>
           <a:bodyPr/>
-          <a:lstStyle>
-            <a:extLst/>
-          </a:lstStyle>
-          <a:p>
-            <a:r>
-              <a:rPr kumimoji="0" lang="zh-CN" altLang="en-US" smtClean="0"/>
+          <a:lstStyle/>
+          <a:p>
+            <a:r>
+              <a:rPr kumimoji="0" lang="zh-CN" altLang="en-US"/>
               <a:t>单击此处编辑母版标题样式</a:t>
             </a:r>
             <a:endParaRPr kumimoji="0" lang="en-US"/>
@@ -993,41 +995,39 @@
         <p:spPr/>
         <p:txBody>
           <a:bodyPr/>
-          <a:lstStyle>
-            <a:extLst/>
-          </a:lstStyle>
+          <a:lstStyle/>
           <a:p>
             <a:pPr lvl="0" eaLnBrk="1" latinLnBrk="0" hangingPunct="1"/>
             <a:r>
-              <a:rPr lang="zh-CN" altLang="en-US" smtClean="0"/>
+              <a:rPr lang="zh-CN" altLang="en-US"/>
               <a:t>单击此处编辑母版文本样式</a:t>
             </a:r>
           </a:p>
           <a:p>
             <a:pPr lvl="1" eaLnBrk="1" latinLnBrk="0" hangingPunct="1"/>
             <a:r>
-              <a:rPr lang="zh-CN" altLang="en-US" smtClean="0"/>
+              <a:rPr lang="zh-CN" altLang="en-US"/>
               <a:t>第二级</a:t>
             </a:r>
           </a:p>
           <a:p>
             <a:pPr lvl="2" eaLnBrk="1" latinLnBrk="0" hangingPunct="1"/>
             <a:r>
-              <a:rPr lang="zh-CN" altLang="en-US" smtClean="0"/>
+              <a:rPr lang="zh-CN" altLang="en-US"/>
               <a:t>第三级</a:t>
             </a:r>
           </a:p>
           <a:p>
             <a:pPr lvl="3" eaLnBrk="1" latinLnBrk="0" hangingPunct="1"/>
             <a:r>
-              <a:rPr lang="zh-CN" altLang="en-US" smtClean="0"/>
+              <a:rPr lang="zh-CN" altLang="en-US"/>
               <a:t>第四级</a:t>
             </a:r>
           </a:p>
           <a:p>
             <a:pPr lvl="4" eaLnBrk="1" latinLnBrk="0" hangingPunct="1"/>
             <a:r>
-              <a:rPr lang="zh-CN" altLang="en-US" smtClean="0"/>
+              <a:rPr lang="zh-CN" altLang="en-US"/>
               <a:t>第五级</a:t>
             </a:r>
             <a:endParaRPr kumimoji="0" lang="en-US"/>
@@ -1052,7 +1052,7 @@
             <a:fld id="{530820CF-B880-4189-942D-D702A7CBA730}" type="datetimeFigureOut">
               <a:rPr lang="zh-CN" altLang="en-US" smtClean="0"/>
               <a:pPr/>
-              <a:t>2018/6/24</a:t>
+              <a:t>2018/6/25</a:t>
             </a:fld>
             <a:endParaRPr lang="zh-CN" altLang="en-US"/>
           </a:p>
@@ -1169,9 +1169,7 @@
         </p:style>
         <p:txBody>
           <a:bodyPr rtlCol="0" anchor="ctr"/>
-          <a:lstStyle>
-            <a:extLst/>
-          </a:lstStyle>
+          <a:lstStyle/>
           <a:p>
             <a:pPr algn="ctr" eaLnBrk="1" latinLnBrk="0" hangingPunct="1"/>
             <a:endParaRPr kumimoji="0" lang="en-US"/>
@@ -1223,9 +1221,7 @@
         </p:style>
         <p:txBody>
           <a:bodyPr rtlCol="0" anchor="ctr"/>
-          <a:lstStyle>
-            <a:extLst/>
-          </a:lstStyle>
+          <a:lstStyle/>
           <a:p>
             <a:pPr algn="ctr" eaLnBrk="1" latinLnBrk="0" hangingPunct="1"/>
             <a:endParaRPr kumimoji="0" lang="en-US"/>
@@ -1269,7 +1265,7 @@
           </a:lstStyle>
           <a:p>
             <a:r>
-              <a:rPr kumimoji="0" lang="zh-CN" altLang="en-US" smtClean="0"/>
+              <a:rPr kumimoji="0" lang="zh-CN" altLang="en-US"/>
               <a:t>单击此处编辑母版标题样式</a:t>
             </a:r>
             <a:endParaRPr kumimoji="0" lang="en-US"/>
@@ -1388,7 +1384,7 @@
           <a:p>
             <a:pPr lvl="0" eaLnBrk="1" latinLnBrk="0" hangingPunct="1"/>
             <a:r>
-              <a:rPr kumimoji="0" lang="zh-CN" altLang="en-US" smtClean="0"/>
+              <a:rPr kumimoji="0" lang="zh-CN" altLang="en-US"/>
               <a:t>单击此处编辑母版文本样式</a:t>
             </a:r>
           </a:p>
@@ -1412,7 +1408,7 @@
             <a:fld id="{530820CF-B880-4189-942D-D702A7CBA730}" type="datetimeFigureOut">
               <a:rPr lang="zh-CN" altLang="en-US" smtClean="0"/>
               <a:pPr/>
-              <a:t>2018/6/24</a:t>
+              <a:t>2018/6/25</a:t>
             </a:fld>
             <a:endParaRPr lang="zh-CN" altLang="en-US"/>
           </a:p>
@@ -1499,12 +1495,10 @@
         <p:spPr/>
         <p:txBody>
           <a:bodyPr/>
-          <a:lstStyle>
-            <a:extLst/>
-          </a:lstStyle>
-          <a:p>
-            <a:r>
-              <a:rPr kumimoji="0" lang="zh-CN" altLang="en-US" smtClean="0"/>
+          <a:lstStyle/>
+          <a:p>
+            <a:r>
+              <a:rPr kumimoji="0" lang="zh-CN" altLang="en-US"/>
               <a:t>单击此处编辑母版标题样式</a:t>
             </a:r>
             <a:endParaRPr kumimoji="0" lang="en-US"/>
@@ -1562,35 +1556,35 @@
           <a:p>
             <a:pPr lvl="0" eaLnBrk="1" latinLnBrk="0" hangingPunct="1"/>
             <a:r>
-              <a:rPr lang="zh-CN" altLang="en-US" smtClean="0"/>
+              <a:rPr lang="zh-CN" altLang="en-US"/>
               <a:t>单击此处编辑母版文本样式</a:t>
             </a:r>
           </a:p>
           <a:p>
             <a:pPr lvl="1" eaLnBrk="1" latinLnBrk="0" hangingPunct="1"/>
             <a:r>
-              <a:rPr lang="zh-CN" altLang="en-US" smtClean="0"/>
+              <a:rPr lang="zh-CN" altLang="en-US"/>
               <a:t>第二级</a:t>
             </a:r>
           </a:p>
           <a:p>
             <a:pPr lvl="2" eaLnBrk="1" latinLnBrk="0" hangingPunct="1"/>
             <a:r>
-              <a:rPr lang="zh-CN" altLang="en-US" smtClean="0"/>
+              <a:rPr lang="zh-CN" altLang="en-US"/>
               <a:t>第三级</a:t>
             </a:r>
           </a:p>
           <a:p>
             <a:pPr lvl="3" eaLnBrk="1" latinLnBrk="0" hangingPunct="1"/>
             <a:r>
-              <a:rPr lang="zh-CN" altLang="en-US" smtClean="0"/>
+              <a:rPr lang="zh-CN" altLang="en-US"/>
               <a:t>第四级</a:t>
             </a:r>
           </a:p>
           <a:p>
             <a:pPr lvl="4" eaLnBrk="1" latinLnBrk="0" hangingPunct="1"/>
             <a:r>
-              <a:rPr lang="zh-CN" altLang="en-US" smtClean="0"/>
+              <a:rPr lang="zh-CN" altLang="en-US"/>
               <a:t>第五级</a:t>
             </a:r>
             <a:endParaRPr kumimoji="0" lang="en-US"/>
@@ -1648,35 +1642,35 @@
           <a:p>
             <a:pPr lvl="0" eaLnBrk="1" latinLnBrk="0" hangingPunct="1"/>
             <a:r>
-              <a:rPr lang="zh-CN" altLang="en-US" smtClean="0"/>
+              <a:rPr lang="zh-CN" altLang="en-US"/>
               <a:t>单击此处编辑母版文本样式</a:t>
             </a:r>
           </a:p>
           <a:p>
             <a:pPr lvl="1" eaLnBrk="1" latinLnBrk="0" hangingPunct="1"/>
             <a:r>
-              <a:rPr lang="zh-CN" altLang="en-US" smtClean="0"/>
+              <a:rPr lang="zh-CN" altLang="en-US"/>
               <a:t>第二级</a:t>
             </a:r>
           </a:p>
           <a:p>
             <a:pPr lvl="2" eaLnBrk="1" latinLnBrk="0" hangingPunct="1"/>
             <a:r>
-              <a:rPr lang="zh-CN" altLang="en-US" smtClean="0"/>
+              <a:rPr lang="zh-CN" altLang="en-US"/>
               <a:t>第三级</a:t>
             </a:r>
           </a:p>
           <a:p>
             <a:pPr lvl="3" eaLnBrk="1" latinLnBrk="0" hangingPunct="1"/>
             <a:r>
-              <a:rPr lang="zh-CN" altLang="en-US" smtClean="0"/>
+              <a:rPr lang="zh-CN" altLang="en-US"/>
               <a:t>第四级</a:t>
             </a:r>
           </a:p>
           <a:p>
             <a:pPr lvl="4" eaLnBrk="1" latinLnBrk="0" hangingPunct="1"/>
             <a:r>
-              <a:rPr lang="zh-CN" altLang="en-US" smtClean="0"/>
+              <a:rPr lang="zh-CN" altLang="en-US"/>
               <a:t>第五级</a:t>
             </a:r>
             <a:endParaRPr kumimoji="0" lang="en-US"/>
@@ -1701,7 +1695,7 @@
             <a:fld id="{530820CF-B880-4189-942D-D702A7CBA730}" type="datetimeFigureOut">
               <a:rPr lang="zh-CN" altLang="en-US" smtClean="0"/>
               <a:pPr/>
-              <a:t>2018/6/24</a:t>
+              <a:t>2018/6/25</a:t>
             </a:fld>
             <a:endParaRPr lang="zh-CN" altLang="en-US"/>
           </a:p>
@@ -1796,7 +1790,7 @@
           </a:lstStyle>
           <a:p>
             <a:r>
-              <a:rPr kumimoji="0" lang="zh-CN" altLang="en-US" smtClean="0"/>
+              <a:rPr kumimoji="0" lang="zh-CN" altLang="en-US"/>
               <a:t>单击此处编辑母版标题样式</a:t>
             </a:r>
             <a:endParaRPr kumimoji="0" lang="en-US"/>
@@ -1863,7 +1857,7 @@
           <a:p>
             <a:pPr lvl="0" eaLnBrk="1" latinLnBrk="0" hangingPunct="1"/>
             <a:r>
-              <a:rPr kumimoji="0" lang="zh-CN" altLang="en-US" smtClean="0"/>
+              <a:rPr kumimoji="0" lang="zh-CN" altLang="en-US"/>
               <a:t>单击此处编辑母版文本样式</a:t>
             </a:r>
           </a:p>
@@ -1920,35 +1914,35 @@
           <a:p>
             <a:pPr lvl="0" eaLnBrk="1" latinLnBrk="0" hangingPunct="1"/>
             <a:r>
-              <a:rPr lang="zh-CN" altLang="en-US" smtClean="0"/>
+              <a:rPr lang="zh-CN" altLang="en-US"/>
               <a:t>单击此处编辑母版文本样式</a:t>
             </a:r>
           </a:p>
           <a:p>
             <a:pPr lvl="1" eaLnBrk="1" latinLnBrk="0" hangingPunct="1"/>
             <a:r>
-              <a:rPr lang="zh-CN" altLang="en-US" smtClean="0"/>
+              <a:rPr lang="zh-CN" altLang="en-US"/>
               <a:t>第二级</a:t>
             </a:r>
           </a:p>
           <a:p>
             <a:pPr lvl="2" eaLnBrk="1" latinLnBrk="0" hangingPunct="1"/>
             <a:r>
-              <a:rPr lang="zh-CN" altLang="en-US" smtClean="0"/>
+              <a:rPr lang="zh-CN" altLang="en-US"/>
               <a:t>第三级</a:t>
             </a:r>
           </a:p>
           <a:p>
             <a:pPr lvl="3" eaLnBrk="1" latinLnBrk="0" hangingPunct="1"/>
             <a:r>
-              <a:rPr lang="zh-CN" altLang="en-US" smtClean="0"/>
+              <a:rPr lang="zh-CN" altLang="en-US"/>
               <a:t>第四级</a:t>
             </a:r>
           </a:p>
           <a:p>
             <a:pPr lvl="4" eaLnBrk="1" latinLnBrk="0" hangingPunct="1"/>
             <a:r>
-              <a:rPr lang="zh-CN" altLang="en-US" smtClean="0"/>
+              <a:rPr lang="zh-CN" altLang="en-US"/>
               <a:t>第五级</a:t>
             </a:r>
             <a:endParaRPr kumimoji="0" lang="en-US"/>
@@ -2015,7 +2009,7 @@
           <a:p>
             <a:pPr lvl="0" eaLnBrk="1" latinLnBrk="0" hangingPunct="1"/>
             <a:r>
-              <a:rPr kumimoji="0" lang="zh-CN" altLang="en-US" smtClean="0"/>
+              <a:rPr kumimoji="0" lang="zh-CN" altLang="en-US"/>
               <a:t>单击此处编辑母版文本样式</a:t>
             </a:r>
           </a:p>
@@ -2072,35 +2066,35 @@
           <a:p>
             <a:pPr lvl="0" eaLnBrk="1" latinLnBrk="0" hangingPunct="1"/>
             <a:r>
-              <a:rPr lang="zh-CN" altLang="en-US" smtClean="0"/>
+              <a:rPr lang="zh-CN" altLang="en-US"/>
               <a:t>单击此处编辑母版文本样式</a:t>
             </a:r>
           </a:p>
           <a:p>
             <a:pPr lvl="1" eaLnBrk="1" latinLnBrk="0" hangingPunct="1"/>
             <a:r>
-              <a:rPr lang="zh-CN" altLang="en-US" smtClean="0"/>
+              <a:rPr lang="zh-CN" altLang="en-US"/>
               <a:t>第二级</a:t>
             </a:r>
           </a:p>
           <a:p>
             <a:pPr lvl="2" eaLnBrk="1" latinLnBrk="0" hangingPunct="1"/>
             <a:r>
-              <a:rPr lang="zh-CN" altLang="en-US" smtClean="0"/>
+              <a:rPr lang="zh-CN" altLang="en-US"/>
               <a:t>第三级</a:t>
             </a:r>
           </a:p>
           <a:p>
             <a:pPr lvl="3" eaLnBrk="1" latinLnBrk="0" hangingPunct="1"/>
             <a:r>
-              <a:rPr lang="zh-CN" altLang="en-US" smtClean="0"/>
+              <a:rPr lang="zh-CN" altLang="en-US"/>
               <a:t>第四级</a:t>
             </a:r>
           </a:p>
           <a:p>
             <a:pPr lvl="4" eaLnBrk="1" latinLnBrk="0" hangingPunct="1"/>
             <a:r>
-              <a:rPr lang="zh-CN" altLang="en-US" smtClean="0"/>
+              <a:rPr lang="zh-CN" altLang="en-US"/>
               <a:t>第五级</a:t>
             </a:r>
             <a:endParaRPr kumimoji="0" lang="en-US"/>
@@ -2125,7 +2119,7 @@
             <a:fld id="{530820CF-B880-4189-942D-D702A7CBA730}" type="datetimeFigureOut">
               <a:rPr lang="zh-CN" altLang="en-US" smtClean="0"/>
               <a:pPr/>
-              <a:t>2018/6/24</a:t>
+              <a:t>2018/6/25</a:t>
             </a:fld>
             <a:endParaRPr lang="zh-CN" altLang="en-US"/>
           </a:p>
@@ -2212,12 +2206,10 @@
         <p:spPr/>
         <p:txBody>
           <a:bodyPr/>
-          <a:lstStyle>
-            <a:extLst/>
-          </a:lstStyle>
-          <a:p>
-            <a:r>
-              <a:rPr kumimoji="0" lang="zh-CN" altLang="en-US" smtClean="0"/>
+          <a:lstStyle/>
+          <a:p>
+            <a:r>
+              <a:rPr kumimoji="0" lang="zh-CN" altLang="en-US"/>
               <a:t>单击此处编辑母版标题样式</a:t>
             </a:r>
             <a:endParaRPr kumimoji="0" lang="en-US"/>
@@ -2242,7 +2234,7 @@
             <a:fld id="{530820CF-B880-4189-942D-D702A7CBA730}" type="datetimeFigureOut">
               <a:rPr lang="zh-CN" altLang="en-US" smtClean="0"/>
               <a:pPr/>
-              <a:t>2018/6/24</a:t>
+              <a:t>2018/6/25</a:t>
             </a:fld>
             <a:endParaRPr lang="zh-CN" altLang="en-US"/>
           </a:p>
@@ -2334,7 +2326,7 @@
             <a:fld id="{530820CF-B880-4189-942D-D702A7CBA730}" type="datetimeFigureOut">
               <a:rPr lang="zh-CN" altLang="en-US" smtClean="0"/>
               <a:pPr/>
-              <a:t>2018/6/24</a:t>
+              <a:t>2018/6/25</a:t>
             </a:fld>
             <a:endParaRPr lang="zh-CN" altLang="en-US"/>
           </a:p>
@@ -2437,7 +2429,7 @@
           </a:lstStyle>
           <a:p>
             <a:r>
-              <a:rPr kumimoji="0" lang="zh-CN" altLang="en-US" smtClean="0"/>
+              <a:rPr kumimoji="0" lang="zh-CN" altLang="en-US"/>
               <a:t>单击此处编辑母版标题样式</a:t>
             </a:r>
             <a:endParaRPr kumimoji="0" lang="en-US"/>
@@ -2495,35 +2487,35 @@
           <a:p>
             <a:pPr lvl="0" eaLnBrk="1" latinLnBrk="0" hangingPunct="1"/>
             <a:r>
-              <a:rPr lang="zh-CN" altLang="en-US" smtClean="0"/>
+              <a:rPr lang="zh-CN" altLang="en-US"/>
               <a:t>单击此处编辑母版文本样式</a:t>
             </a:r>
           </a:p>
           <a:p>
             <a:pPr lvl="1" eaLnBrk="1" latinLnBrk="0" hangingPunct="1"/>
             <a:r>
-              <a:rPr lang="zh-CN" altLang="en-US" smtClean="0"/>
+              <a:rPr lang="zh-CN" altLang="en-US"/>
               <a:t>第二级</a:t>
             </a:r>
           </a:p>
           <a:p>
             <a:pPr lvl="2" eaLnBrk="1" latinLnBrk="0" hangingPunct="1"/>
             <a:r>
-              <a:rPr lang="zh-CN" altLang="en-US" smtClean="0"/>
+              <a:rPr lang="zh-CN" altLang="en-US"/>
               <a:t>第三级</a:t>
             </a:r>
           </a:p>
           <a:p>
             <a:pPr lvl="3" eaLnBrk="1" latinLnBrk="0" hangingPunct="1"/>
             <a:r>
-              <a:rPr lang="zh-CN" altLang="en-US" smtClean="0"/>
+              <a:rPr lang="zh-CN" altLang="en-US"/>
               <a:t>第四级</a:t>
             </a:r>
           </a:p>
           <a:p>
             <a:pPr lvl="4" eaLnBrk="1" latinLnBrk="0" hangingPunct="1"/>
             <a:r>
-              <a:rPr lang="zh-CN" altLang="en-US" smtClean="0"/>
+              <a:rPr lang="zh-CN" altLang="en-US"/>
               <a:t>第五级</a:t>
             </a:r>
             <a:endParaRPr kumimoji="0" lang="en-US"/>
@@ -2590,7 +2582,7 @@
           <a:p>
             <a:pPr lvl="0" eaLnBrk="1" latinLnBrk="0" hangingPunct="1"/>
             <a:r>
-              <a:rPr kumimoji="0" lang="zh-CN" altLang="en-US" smtClean="0"/>
+              <a:rPr kumimoji="0" lang="zh-CN" altLang="en-US"/>
               <a:t>单击此处编辑母版文本样式</a:t>
             </a:r>
           </a:p>
@@ -2614,7 +2606,7 @@
             <a:fld id="{530820CF-B880-4189-942D-D702A7CBA730}" type="datetimeFigureOut">
               <a:rPr lang="zh-CN" altLang="en-US" smtClean="0"/>
               <a:pPr/>
-              <a:t>2018/6/24</a:t>
+              <a:t>2018/6/25</a:t>
             </a:fld>
             <a:endParaRPr lang="zh-CN" altLang="en-US"/>
           </a:p>
@@ -2701,9 +2693,7 @@
         </p:style>
         <p:txBody>
           <a:bodyPr rtlCol="0" anchor="ctr"/>
-          <a:lstStyle>
-            <a:extLst/>
-          </a:lstStyle>
+          <a:lstStyle/>
           <a:p>
             <a:pPr algn="ctr" eaLnBrk="1" latinLnBrk="0" hangingPunct="1"/>
             <a:endParaRPr kumimoji="0" lang="en-US"/>
@@ -2748,9 +2738,7 @@
         </p:style>
         <p:txBody>
           <a:bodyPr rtlCol="0" anchor="ctr"/>
-          <a:lstStyle>
-            <a:extLst/>
-          </a:lstStyle>
+          <a:lstStyle/>
           <a:p>
             <a:pPr algn="ctr" eaLnBrk="1" latinLnBrk="0" hangingPunct="1"/>
             <a:endParaRPr kumimoji="0" lang="en-US"/>
@@ -2815,7 +2803,7 @@
           </a:lstStyle>
           <a:p>
             <a:r>
-              <a:rPr kumimoji="0" lang="zh-CN" altLang="en-US" smtClean="0"/>
+              <a:rPr kumimoji="0" lang="zh-CN" altLang="en-US"/>
               <a:t>单击此处编辑母版标题样式</a:t>
             </a:r>
             <a:endParaRPr kumimoji="0" lang="en-US"/>
@@ -2886,7 +2874,7 @@
           </a:lstStyle>
           <a:p>
             <a:r>
-              <a:rPr kumimoji="0" lang="zh-CN" altLang="en-US" smtClean="0"/>
+              <a:rPr kumimoji="0" lang="zh-CN" altLang="en-US"/>
               <a:t>单击图标添加图片</a:t>
             </a:r>
             <a:endParaRPr kumimoji="0" lang="en-US" dirty="0"/>
@@ -2953,7 +2941,7 @@
           <a:p>
             <a:pPr lvl="0" eaLnBrk="1" latinLnBrk="0" hangingPunct="1"/>
             <a:r>
-              <a:rPr kumimoji="0" lang="zh-CN" altLang="en-US" smtClean="0"/>
+              <a:rPr kumimoji="0" lang="zh-CN" altLang="en-US"/>
               <a:t>单击此处编辑母版文本样式</a:t>
             </a:r>
           </a:p>
@@ -2982,7 +2970,7 @@
             <a:fld id="{530820CF-B880-4189-942D-D702A7CBA730}" type="datetimeFigureOut">
               <a:rPr lang="zh-CN" altLang="en-US" smtClean="0"/>
               <a:pPr/>
-              <a:t>2018/6/24</a:t>
+              <a:t>2018/6/25</a:t>
             </a:fld>
             <a:endParaRPr lang="zh-CN" altLang="en-US"/>
           </a:p>
@@ -3026,9 +3014,7 @@
         </p:style>
         <p:txBody>
           <a:bodyPr rtlCol="0" anchor="ctr"/>
-          <a:lstStyle>
-            <a:extLst/>
-          </a:lstStyle>
+          <a:lstStyle/>
           <a:p>
             <a:pPr algn="ctr" eaLnBrk="1" latinLnBrk="0" hangingPunct="1"/>
             <a:endParaRPr kumimoji="0" lang="en-US"/>
@@ -3073,9 +3059,7 @@
         </p:style>
         <p:txBody>
           <a:bodyPr rtlCol="0" anchor="ctr"/>
-          <a:lstStyle>
-            <a:extLst/>
-          </a:lstStyle>
+          <a:lstStyle/>
           <a:p>
             <a:pPr algn="ctr" eaLnBrk="1" latinLnBrk="0" hangingPunct="1"/>
             <a:endParaRPr kumimoji="0" lang="en-US"/>
@@ -3220,9 +3204,7 @@
         </p:style>
         <p:txBody>
           <a:bodyPr rtlCol="0" anchor="ctr"/>
-          <a:lstStyle>
-            <a:extLst/>
-          </a:lstStyle>
+          <a:lstStyle/>
           <a:p>
             <a:pPr algn="ctr" eaLnBrk="1" latinLnBrk="0" hangingPunct="1"/>
             <a:endParaRPr kumimoji="0" lang="en-US"/>
@@ -3267,9 +3249,7 @@
         </p:style>
         <p:txBody>
           <a:bodyPr rtlCol="0" anchor="ctr"/>
-          <a:lstStyle>
-            <a:extLst/>
-          </a:lstStyle>
+          <a:lstStyle/>
           <a:p>
             <a:pPr algn="ctr" eaLnBrk="1" latinLnBrk="0" hangingPunct="1"/>
             <a:endParaRPr kumimoji="0" lang="en-US"/>
@@ -3308,12 +3288,10 @@
               <a:bevelT w="50800" h="10160"/>
             </a:sp3d>
           </a:bodyPr>
-          <a:lstStyle>
-            <a:extLst/>
-          </a:lstStyle>
-          <a:p>
-            <a:r>
-              <a:rPr kumimoji="0" lang="zh-CN" altLang="en-US" smtClean="0"/>
+          <a:lstStyle/>
+          <a:p>
+            <a:r>
+              <a:rPr kumimoji="0" lang="zh-CN" altLang="en-US"/>
               <a:t>单击此处编辑母版标题样式</a:t>
             </a:r>
             <a:endParaRPr kumimoji="0" lang="en-US"/>
@@ -3343,41 +3321,39 @@
           <a:bodyPr vert="horz" lIns="54864" tIns="91440" rtlCol="0">
             <a:normAutofit/>
           </a:bodyPr>
-          <a:lstStyle>
-            <a:extLst/>
-          </a:lstStyle>
+          <a:lstStyle/>
           <a:p>
             <a:pPr lvl="0" eaLnBrk="1" latinLnBrk="0" hangingPunct="1"/>
             <a:r>
-              <a:rPr kumimoji="0" lang="zh-CN" altLang="en-US" smtClean="0"/>
+              <a:rPr kumimoji="0" lang="zh-CN" altLang="en-US"/>
               <a:t>单击此处编辑母版文本样式</a:t>
             </a:r>
           </a:p>
           <a:p>
             <a:pPr lvl="1" eaLnBrk="1" latinLnBrk="0" hangingPunct="1"/>
             <a:r>
-              <a:rPr kumimoji="0" lang="zh-CN" altLang="en-US" smtClean="0"/>
+              <a:rPr kumimoji="0" lang="zh-CN" altLang="en-US"/>
               <a:t>第二级</a:t>
             </a:r>
           </a:p>
           <a:p>
             <a:pPr lvl="2" eaLnBrk="1" latinLnBrk="0" hangingPunct="1"/>
             <a:r>
-              <a:rPr kumimoji="0" lang="zh-CN" altLang="en-US" smtClean="0"/>
+              <a:rPr kumimoji="0" lang="zh-CN" altLang="en-US"/>
               <a:t>第三级</a:t>
             </a:r>
           </a:p>
           <a:p>
             <a:pPr lvl="3" eaLnBrk="1" latinLnBrk="0" hangingPunct="1"/>
             <a:r>
-              <a:rPr kumimoji="0" lang="zh-CN" altLang="en-US" smtClean="0"/>
+              <a:rPr kumimoji="0" lang="zh-CN" altLang="en-US"/>
               <a:t>第四级</a:t>
             </a:r>
           </a:p>
           <a:p>
             <a:pPr lvl="4" eaLnBrk="1" latinLnBrk="0" hangingPunct="1"/>
             <a:r>
-              <a:rPr kumimoji="0" lang="zh-CN" altLang="en-US" smtClean="0"/>
+              <a:rPr kumimoji="0" lang="zh-CN" altLang="en-US"/>
               <a:t>第五级</a:t>
             </a:r>
             <a:endParaRPr kumimoji="0" lang="en-US"/>
@@ -3421,7 +3397,7 @@
             <a:fld id="{530820CF-B880-4189-942D-D702A7CBA730}" type="datetimeFigureOut">
               <a:rPr lang="zh-CN" altLang="en-US" smtClean="0"/>
               <a:pPr/>
-              <a:t>2018/6/24</a:t>
+              <a:t>2018/6/25</a:t>
             </a:fld>
             <a:endParaRPr lang="zh-CN" altLang="en-US"/>
           </a:p>
@@ -3844,15 +3820,11 @@
           <a:lstStyle/>
           <a:p>
             <a:r>
-              <a:rPr lang="en-US" altLang="zh-CN" dirty="0" err="1" smtClean="0"/>
-              <a:t>a</a:t>
-            </a:r>
-            <a:r>
-              <a:rPr lang="en-US" altLang="zh-CN" dirty="0" err="1" smtClean="0"/>
-              <a:t>sync&amp;await</a:t>
-            </a:r>
-            <a:r>
-              <a:rPr lang="en-US" altLang="zh-CN" dirty="0" smtClean="0"/>
+              <a:rPr lang="en-US" altLang="zh-CN" dirty="0" err="1"/>
+              <a:t>async&amp;await</a:t>
+            </a:r>
+            <a:r>
+              <a:rPr lang="en-US" altLang="zh-CN" dirty="0"/>
               <a:t> in JS</a:t>
             </a:r>
             <a:endParaRPr lang="zh-CN" altLang="en-US" dirty="0"/>
@@ -3900,7 +3872,7 @@
           <a:lstStyle/>
           <a:p>
             <a:r>
-              <a:rPr lang="en-US" altLang="zh-CN" dirty="0" smtClean="0"/>
+              <a:rPr lang="en-US" altLang="zh-CN" dirty="0"/>
               <a:t>agenda</a:t>
             </a:r>
             <a:endParaRPr lang="zh-CN" altLang="en-US" dirty="0"/>
@@ -3923,33 +3895,29 @@
           <a:lstStyle/>
           <a:p>
             <a:r>
-              <a:rPr lang="en-US" altLang="zh-CN" dirty="0" smtClean="0"/>
+              <a:rPr lang="en-US" altLang="zh-CN" dirty="0"/>
               <a:t>Usage of </a:t>
             </a:r>
             <a:r>
-              <a:rPr lang="en-US" altLang="zh-CN" dirty="0" err="1" smtClean="0"/>
+              <a:rPr lang="en-US" altLang="zh-CN" dirty="0" err="1"/>
               <a:t>async&amp;await</a:t>
             </a:r>
-            <a:endParaRPr lang="en-US" altLang="zh-CN" dirty="0" smtClean="0"/>
-          </a:p>
-          <a:p>
-            <a:r>
-              <a:rPr lang="en-US" altLang="zh-CN" dirty="0" err="1" smtClean="0"/>
-              <a:t>a</a:t>
-            </a:r>
-            <a:r>
-              <a:rPr lang="en-US" altLang="zh-CN" dirty="0" err="1" smtClean="0"/>
-              <a:t>sync</a:t>
-            </a:r>
-            <a:r>
-              <a:rPr lang="en-US" altLang="zh-CN" dirty="0" smtClean="0"/>
+            <a:endParaRPr lang="en-US" altLang="zh-CN" dirty="0"/>
+          </a:p>
+          <a:p>
+            <a:r>
+              <a:rPr lang="en-US" altLang="zh-CN" dirty="0" err="1"/>
+              <a:t>async</a:t>
+            </a:r>
+            <a:r>
+              <a:rPr lang="en-US" altLang="zh-CN" dirty="0"/>
               <a:t> in </a:t>
             </a:r>
             <a:r>
-              <a:rPr lang="en-US" altLang="zh-CN" dirty="0" err="1" smtClean="0"/>
+              <a:rPr lang="en-US" altLang="zh-CN" dirty="0" err="1"/>
               <a:t>angularJS</a:t>
             </a:r>
-            <a:endParaRPr lang="en-US" altLang="zh-CN" dirty="0" smtClean="0"/>
+            <a:endParaRPr lang="en-US" altLang="zh-CN" dirty="0"/>
           </a:p>
           <a:p>
             <a:endParaRPr lang="zh-CN" altLang="en-US" dirty="0"/>
@@ -3997,16 +3965,12 @@
           <a:lstStyle/>
           <a:p>
             <a:r>
-              <a:rPr lang="en-US" altLang="zh-CN" dirty="0" smtClean="0"/>
+              <a:rPr lang="en-US" altLang="zh-CN" dirty="0"/>
               <a:t>Usage of </a:t>
             </a:r>
             <a:r>
-              <a:rPr lang="en-US" altLang="zh-CN" dirty="0" err="1" smtClean="0"/>
-              <a:t>a</a:t>
-            </a:r>
-            <a:r>
-              <a:rPr lang="en-US" altLang="zh-CN" dirty="0" err="1" smtClean="0"/>
-              <a:t>sync</a:t>
+              <a:rPr lang="en-US" altLang="zh-CN" dirty="0" err="1"/>
+              <a:t>async</a:t>
             </a:r>
             <a:endParaRPr lang="zh-CN" altLang="en-US" dirty="0"/>
           </a:p>
@@ -4028,35 +3992,188 @@
           <a:lstStyle/>
           <a:p>
             <a:r>
-              <a:rPr lang="en-US" altLang="zh-CN" dirty="0" smtClean="0"/>
-              <a:t>Purpose</a:t>
-            </a:r>
-          </a:p>
-          <a:p>
-            <a:pPr lvl="1">
-              <a:buNone/>
-            </a:pPr>
-            <a:r>
-              <a:rPr lang="en-US" altLang="zh-CN" dirty="0" smtClean="0"/>
-              <a:t>write </a:t>
-            </a:r>
-            <a:r>
-              <a:rPr lang="en-US" altLang="zh-CN" dirty="0" err="1" smtClean="0"/>
+              <a:rPr lang="en-US" altLang="zh-CN" dirty="0"/>
+              <a:t>Purpose : write </a:t>
+            </a:r>
+            <a:r>
+              <a:rPr lang="en-US" altLang="zh-CN" dirty="0" err="1"/>
               <a:t>async</a:t>
             </a:r>
             <a:r>
-              <a:rPr lang="en-US" altLang="zh-CN" dirty="0" smtClean="0"/>
+              <a:rPr lang="en-US" altLang="zh-CN" dirty="0"/>
               <a:t> code in sync style</a:t>
             </a:r>
             <a:endParaRPr lang="zh-CN" altLang="en-US" dirty="0"/>
           </a:p>
         </p:txBody>
       </p:sp>
+      <p:pic>
+        <p:nvPicPr>
+          <p:cNvPr id="9" name="Picture 8">
+            <a:extLst>
+              <a:ext uri="{FF2B5EF4-FFF2-40B4-BE49-F238E27FC236}">
+                <a16:creationId xmlns:a16="http://schemas.microsoft.com/office/drawing/2014/main" id="{D18D2952-825D-47F0-A68F-7A013793DE3F}"/>
+              </a:ext>
+            </a:extLst>
+          </p:cNvPr>
+          <p:cNvPicPr>
+            <a:picLocks noChangeAspect="1"/>
+          </p:cNvPicPr>
+          <p:nvPr/>
+        </p:nvPicPr>
+        <p:blipFill>
+          <a:blip r:embed="rId2"/>
+          <a:stretch>
+            <a:fillRect/>
+          </a:stretch>
+        </p:blipFill>
+        <p:spPr>
+          <a:xfrm>
+            <a:off x="899592" y="2358180"/>
+            <a:ext cx="3312368" cy="4499820"/>
+          </a:xfrm>
+          <a:prstGeom prst="rect">
+            <a:avLst/>
+          </a:prstGeom>
+        </p:spPr>
+      </p:pic>
+      <p:pic>
+        <p:nvPicPr>
+          <p:cNvPr id="10" name="Picture 9">
+            <a:extLst>
+              <a:ext uri="{FF2B5EF4-FFF2-40B4-BE49-F238E27FC236}">
+                <a16:creationId xmlns:a16="http://schemas.microsoft.com/office/drawing/2014/main" id="{0DD7353C-B21A-4F37-8AEF-07446FC43569}"/>
+              </a:ext>
+            </a:extLst>
+          </p:cNvPr>
+          <p:cNvPicPr>
+            <a:picLocks noChangeAspect="1"/>
+          </p:cNvPicPr>
+          <p:nvPr/>
+        </p:nvPicPr>
+        <p:blipFill>
+          <a:blip r:embed="rId3"/>
+          <a:stretch>
+            <a:fillRect/>
+          </a:stretch>
+        </p:blipFill>
+        <p:spPr>
+          <a:xfrm>
+            <a:off x="4427984" y="2924944"/>
+            <a:ext cx="4350971" cy="3087044"/>
+          </a:xfrm>
+          <a:prstGeom prst="rect">
+            <a:avLst/>
+          </a:prstGeom>
+        </p:spPr>
+      </p:pic>
     </p:spTree>
   </p:cSld>
   <p:clrMapOvr>
     <a:masterClrMapping/>
   </p:clrMapOvr>
+  <p:timing>
+    <p:tnLst>
+      <p:par>
+        <p:cTn id="1" dur="indefinite" restart="never" nodeType="tmRoot">
+          <p:childTnLst>
+            <p:seq concurrent="1" nextAc="seek">
+              <p:cTn id="2" dur="indefinite" nodeType="mainSeq">
+                <p:childTnLst>
+                  <p:par>
+                    <p:cTn id="3" fill="hold">
+                      <p:stCondLst>
+                        <p:cond delay="indefinite"/>
+                      </p:stCondLst>
+                      <p:childTnLst>
+                        <p:par>
+                          <p:cTn id="4" fill="hold">
+                            <p:stCondLst>
+                              <p:cond delay="0"/>
+                            </p:stCondLst>
+                            <p:childTnLst>
+                              <p:par>
+                                <p:cTn id="5" presetID="1" presetClass="entr" presetSubtype="0" fill="hold" nodeType="clickEffect">
+                                  <p:stCondLst>
+                                    <p:cond delay="0"/>
+                                  </p:stCondLst>
+                                  <p:childTnLst>
+                                    <p:set>
+                                      <p:cBhvr>
+                                        <p:cTn id="6" dur="1" fill="hold">
+                                          <p:stCondLst>
+                                            <p:cond delay="0"/>
+                                          </p:stCondLst>
+                                        </p:cTn>
+                                        <p:tgtEl>
+                                          <p:spTgt spid="9"/>
+                                        </p:tgtEl>
+                                        <p:attrNameLst>
+                                          <p:attrName>style.visibility</p:attrName>
+                                        </p:attrNameLst>
+                                      </p:cBhvr>
+                                      <p:to>
+                                        <p:strVal val="visible"/>
+                                      </p:to>
+                                    </p:set>
+                                  </p:childTnLst>
+                                </p:cTn>
+                              </p:par>
+                              <p:par>
+                                <p:cTn id="7" presetID="1" presetClass="entr" presetSubtype="0" fill="hold" nodeType="withEffect">
+                                  <p:stCondLst>
+                                    <p:cond delay="0"/>
+                                  </p:stCondLst>
+                                  <p:childTnLst>
+                                    <p:set>
+                                      <p:cBhvr>
+                                        <p:cTn id="8" dur="1" fill="hold">
+                                          <p:stCondLst>
+                                            <p:cond delay="0"/>
+                                          </p:stCondLst>
+                                        </p:cTn>
+                                        <p:tgtEl>
+                                          <p:spTgt spid="10"/>
+                                        </p:tgtEl>
+                                        <p:attrNameLst>
+                                          <p:attrName>style.visibility</p:attrName>
+                                        </p:attrNameLst>
+                                      </p:cBhvr>
+                                      <p:to>
+                                        <p:strVal val="visible"/>
+                                      </p:to>
+                                    </p:set>
+                                  </p:childTnLst>
+                                </p:cTn>
+                              </p:par>
+                            </p:childTnLst>
+                          </p:cTn>
+                        </p:par>
+                      </p:childTnLst>
+                    </p:cTn>
+                  </p:par>
+                </p:childTnLst>
+              </p:cTn>
+              <p:prevCondLst>
+                <p:cond evt="onPrev" delay="0">
+                  <p:tgtEl>
+                    <p:sldTgt/>
+                  </p:tgtEl>
+                </p:cond>
+              </p:prevCondLst>
+              <p:nextCondLst>
+                <p:cond evt="onNext" delay="0">
+                  <p:tgtEl>
+                    <p:sldTgt/>
+                  </p:tgtEl>
+                </p:cond>
+              </p:nextCondLst>
+            </p:seq>
+          </p:childTnLst>
+        </p:cTn>
+      </p:par>
+    </p:tnLst>
+  </p:timing>
 </p:sld>
 </file>
 
@@ -4093,11 +4210,11 @@
           <a:lstStyle/>
           <a:p>
             <a:r>
-              <a:rPr lang="en-US" altLang="zh-CN" dirty="0" smtClean="0"/>
+              <a:rPr lang="en-US" altLang="zh-CN" dirty="0"/>
               <a:t>Syntax of </a:t>
             </a:r>
             <a:r>
-              <a:rPr lang="en-US" altLang="zh-CN" dirty="0" err="1" smtClean="0"/>
+              <a:rPr lang="en-US" altLang="zh-CN" dirty="0" err="1"/>
               <a:t>async</a:t>
             </a:r>
             <a:endParaRPr lang="zh-CN" altLang="en-US" dirty="0"/>
@@ -4123,19 +4240,19 @@
               <a:buNone/>
             </a:pPr>
             <a:r>
-              <a:rPr lang="en-US" altLang="zh-CN" dirty="0" err="1" smtClean="0"/>
+              <a:rPr lang="en-US" altLang="zh-CN" dirty="0" err="1"/>
               <a:t>async</a:t>
             </a:r>
             <a:r>
-              <a:rPr lang="en-US" altLang="zh-CN" dirty="0" smtClean="0"/>
+              <a:rPr lang="en-US" altLang="zh-CN" dirty="0"/>
               <a:t> function </a:t>
             </a:r>
             <a:r>
-              <a:rPr lang="en-US" altLang="zh-CN" dirty="0" err="1" smtClean="0"/>
+              <a:rPr lang="en-US" altLang="zh-CN" dirty="0" err="1"/>
               <a:t>demoAsync</a:t>
             </a:r>
             <a:r>
-              <a:rPr lang="en-US" altLang="zh-CN" dirty="0" smtClean="0"/>
+              <a:rPr lang="en-US" altLang="zh-CN" dirty="0"/>
               <a:t>(){</a:t>
             </a:r>
           </a:p>
@@ -4144,12 +4261,8 @@
               <a:buNone/>
             </a:pPr>
             <a:r>
-              <a:rPr lang="en-US" altLang="zh-CN" dirty="0" smtClean="0"/>
-              <a:t>	</a:t>
-            </a:r>
-            <a:r>
-              <a:rPr lang="en-US" altLang="zh-CN" dirty="0" smtClean="0"/>
-              <a:t>…</a:t>
+              <a:rPr lang="en-US" altLang="zh-CN" dirty="0"/>
+              <a:t>	…</a:t>
             </a:r>
           </a:p>
           <a:p>
@@ -4157,19 +4270,15 @@
               <a:buNone/>
             </a:pPr>
             <a:r>
-              <a:rPr lang="en-US" altLang="zh-CN" dirty="0" smtClean="0"/>
-              <a:t>	</a:t>
-            </a:r>
-            <a:r>
-              <a:rPr lang="en-US" altLang="zh-CN" dirty="0" smtClean="0"/>
-              <a:t>await </a:t>
-            </a:r>
-            <a:r>
-              <a:rPr lang="en-US" altLang="zh-CN" dirty="0" err="1" smtClean="0"/>
+              <a:rPr lang="en-US" altLang="zh-CN" dirty="0"/>
+              <a:t>	await </a:t>
+            </a:r>
+            <a:r>
+              <a:rPr lang="en-US" altLang="zh-CN" dirty="0" err="1"/>
               <a:t>doSomethingAsync</a:t>
             </a:r>
             <a:r>
-              <a:rPr lang="en-US" altLang="zh-CN" dirty="0" smtClean="0"/>
+              <a:rPr lang="en-US" altLang="zh-CN" dirty="0"/>
               <a:t>(…);</a:t>
             </a:r>
           </a:p>
@@ -4178,12 +4287,8 @@
               <a:buNone/>
             </a:pPr>
             <a:r>
-              <a:rPr lang="en-US" altLang="zh-CN" dirty="0" smtClean="0"/>
-              <a:t>	</a:t>
-            </a:r>
-            <a:r>
-              <a:rPr lang="en-US" altLang="zh-CN" dirty="0" smtClean="0"/>
-              <a:t>…</a:t>
+              <a:rPr lang="en-US" altLang="zh-CN" dirty="0"/>
+              <a:t>	…</a:t>
             </a:r>
           </a:p>
           <a:p>
@@ -4191,7 +4296,7 @@
               <a:buNone/>
             </a:pPr>
             <a:r>
-              <a:rPr lang="en-US" altLang="zh-CN" dirty="0" smtClean="0"/>
+              <a:rPr lang="en-US" altLang="zh-CN" dirty="0"/>
               <a:t>}</a:t>
             </a:r>
           </a:p>
@@ -4199,18 +4304,18 @@
             <a:pPr>
               <a:buNone/>
             </a:pPr>
-            <a:endParaRPr lang="en-US" altLang="zh-CN" dirty="0" smtClean="0"/>
+            <a:endParaRPr lang="en-US" altLang="zh-CN" dirty="0"/>
           </a:p>
           <a:p>
             <a:pPr>
               <a:buNone/>
             </a:pPr>
             <a:r>
-              <a:rPr lang="en-US" altLang="zh-CN" dirty="0" err="1" smtClean="0"/>
+              <a:rPr lang="en-US" altLang="zh-CN" dirty="0" err="1"/>
               <a:t>demoAsync</a:t>
             </a:r>
             <a:r>
-              <a:rPr lang="en-US" altLang="zh-CN" dirty="0" smtClean="0"/>
+              <a:rPr lang="en-US" altLang="zh-CN" dirty="0"/>
               <a:t>();</a:t>
             </a:r>
           </a:p>
@@ -4219,11 +4324,11 @@
               <a:buNone/>
             </a:pPr>
             <a:r>
-              <a:rPr lang="en-US" altLang="zh-CN" dirty="0" err="1" smtClean="0"/>
+              <a:rPr lang="en-US" altLang="zh-CN" dirty="0" err="1"/>
               <a:t>doOtherThings</a:t>
             </a:r>
             <a:r>
-              <a:rPr lang="en-US" altLang="zh-CN" dirty="0" smtClean="0"/>
+              <a:rPr lang="en-US" altLang="zh-CN" dirty="0"/>
               <a:t>();</a:t>
             </a:r>
             <a:endParaRPr lang="zh-CN" altLang="en-US" dirty="0"/>
@@ -4273,11 +4378,11 @@
           <a:lstStyle/>
           <a:p>
             <a:r>
-              <a:rPr lang="en-US" altLang="zh-CN" dirty="0" smtClean="0"/>
+              <a:rPr lang="en-US" altLang="zh-CN" dirty="0"/>
               <a:t>Tips of using </a:t>
             </a:r>
             <a:r>
-              <a:rPr lang="en-US" altLang="zh-CN" dirty="0" err="1" smtClean="0"/>
+              <a:rPr lang="en-US" altLang="zh-CN" dirty="0" err="1"/>
               <a:t>async&amp;await</a:t>
             </a:r>
             <a:endParaRPr lang="zh-CN" altLang="en-US" dirty="0"/>
@@ -4306,11 +4411,11 @@
               <a:buAutoNum type="arabicPeriod"/>
             </a:pPr>
             <a:r>
-              <a:rPr lang="en-US" altLang="zh-CN" dirty="0" err="1" smtClean="0"/>
+              <a:rPr lang="en-US" altLang="zh-CN" dirty="0" err="1"/>
               <a:t>async</a:t>
             </a:r>
             <a:r>
-              <a:rPr lang="en-US" altLang="zh-CN" dirty="0" smtClean="0"/>
+              <a:rPr lang="en-US" altLang="zh-CN" dirty="0"/>
               <a:t> functions always return promise</a:t>
             </a:r>
           </a:p>
@@ -4319,7 +4424,7 @@
               <a:buFont typeface="+mj-lt"/>
               <a:buAutoNum type="arabicPeriod"/>
             </a:pPr>
-            <a:endParaRPr lang="en-US" altLang="zh-CN" dirty="0" smtClean="0"/>
+            <a:endParaRPr lang="en-US" altLang="zh-CN" dirty="0"/>
           </a:p>
           <a:p>
             <a:pPr marL="514350" indent="-514350">
@@ -4327,15 +4432,15 @@
               <a:buAutoNum type="arabicPeriod"/>
             </a:pPr>
             <a:r>
-              <a:rPr lang="en-US" altLang="zh-CN" dirty="0" smtClean="0"/>
+              <a:rPr lang="en-US" altLang="zh-CN" dirty="0"/>
               <a:t>use await inside </a:t>
             </a:r>
             <a:r>
-              <a:rPr lang="en-US" altLang="zh-CN" dirty="0" err="1" smtClean="0"/>
+              <a:rPr lang="en-US" altLang="zh-CN" dirty="0" err="1"/>
               <a:t>async</a:t>
             </a:r>
             <a:r>
-              <a:rPr lang="en-US" altLang="zh-CN" dirty="0" smtClean="0"/>
+              <a:rPr lang="en-US" altLang="zh-CN" dirty="0"/>
               <a:t> functions</a:t>
             </a:r>
           </a:p>
@@ -4344,7 +4449,7 @@
               <a:buFont typeface="+mj-lt"/>
               <a:buAutoNum type="arabicPeriod"/>
             </a:pPr>
-            <a:endParaRPr lang="en-US" altLang="zh-CN" dirty="0" smtClean="0"/>
+            <a:endParaRPr lang="en-US" altLang="zh-CN" dirty="0"/>
           </a:p>
           <a:p>
             <a:pPr marL="514350" indent="-514350">
@@ -4352,7 +4457,7 @@
               <a:buAutoNum type="arabicPeriod"/>
             </a:pPr>
             <a:r>
-              <a:rPr lang="en-US" altLang="zh-CN" dirty="0" smtClean="0"/>
+              <a:rPr lang="en-US" altLang="zh-CN" dirty="0"/>
               <a:t>use try catch if necessary</a:t>
             </a:r>
           </a:p>
@@ -4361,7 +4466,7 @@
               <a:buFont typeface="+mj-lt"/>
               <a:buAutoNum type="arabicPeriod"/>
             </a:pPr>
-            <a:endParaRPr lang="en-US" altLang="zh-CN" dirty="0" smtClean="0"/>
+            <a:endParaRPr lang="en-US" altLang="zh-CN" dirty="0"/>
           </a:p>
         </p:txBody>
       </p:sp>
@@ -4408,15 +4513,15 @@
           <a:lstStyle/>
           <a:p>
             <a:r>
-              <a:rPr lang="en-US" altLang="zh-CN" dirty="0" smtClean="0"/>
+              <a:rPr lang="en-US" altLang="zh-CN" dirty="0"/>
               <a:t>Tips of using </a:t>
             </a:r>
             <a:r>
-              <a:rPr lang="en-US" altLang="zh-CN" dirty="0" err="1" smtClean="0"/>
+              <a:rPr lang="en-US" altLang="zh-CN" dirty="0" err="1"/>
               <a:t>async&amp;await</a:t>
             </a:r>
             <a:r>
-              <a:rPr lang="en-US" altLang="zh-CN" dirty="0" smtClean="0"/>
+              <a:rPr lang="en-US" altLang="zh-CN" dirty="0"/>
               <a:t> (cont.)</a:t>
             </a:r>
             <a:endParaRPr lang="zh-CN" altLang="en-US" dirty="0"/>
@@ -4445,20 +4550,12 @@
               <a:buAutoNum type="arabicPeriod" startAt="4"/>
             </a:pPr>
             <a:r>
-              <a:rPr lang="en-US" altLang="zh-CN" dirty="0" err="1" smtClean="0"/>
+              <a:rPr lang="en-US" altLang="zh-CN" dirty="0" err="1"/>
               <a:t>async</a:t>
             </a:r>
             <a:r>
-              <a:rPr lang="en-US" altLang="zh-CN" dirty="0" smtClean="0"/>
-              <a:t> </a:t>
-            </a:r>
-            <a:r>
-              <a:rPr lang="en-US" altLang="zh-CN" dirty="0" smtClean="0"/>
-              <a:t>functions are started synchronously, settled </a:t>
-            </a:r>
-            <a:r>
-              <a:rPr lang="en-US" altLang="zh-CN" dirty="0" smtClean="0"/>
-              <a:t>asynchronously</a:t>
+              <a:rPr lang="en-US" altLang="zh-CN" dirty="0"/>
+              <a:t> functions are started synchronously, settled asynchronously</a:t>
             </a:r>
           </a:p>
           <a:p>
@@ -4466,7 +4563,7 @@
               <a:buFont typeface="+mj-lt"/>
               <a:buAutoNum type="arabicPeriod" startAt="4"/>
             </a:pPr>
-            <a:endParaRPr lang="en-US" altLang="zh-CN" dirty="0" smtClean="0"/>
+            <a:endParaRPr lang="en-US" altLang="zh-CN" dirty="0"/>
           </a:p>
           <a:p>
             <a:pPr marL="514350" indent="-514350">
@@ -4474,7 +4571,7 @@
               <a:buAutoNum type="arabicPeriod" startAt="4"/>
             </a:pPr>
             <a:r>
-              <a:rPr lang="en-US" altLang="zh-CN" dirty="0" smtClean="0"/>
+              <a:rPr lang="en-US" altLang="zh-CN" dirty="0"/>
               <a:t>parallelism </a:t>
             </a:r>
             <a:endParaRPr lang="zh-CN" altLang="en-US" dirty="0"/>
@@ -4522,15 +4619,15 @@
           <a:lstStyle/>
           <a:p>
             <a:r>
-              <a:rPr lang="en-US" altLang="zh-CN" dirty="0" smtClean="0"/>
+              <a:rPr lang="en-US" altLang="zh-CN" dirty="0"/>
               <a:t>use </a:t>
             </a:r>
             <a:r>
-              <a:rPr lang="en-US" altLang="zh-CN" dirty="0" err="1" smtClean="0"/>
+              <a:rPr lang="en-US" altLang="zh-CN" dirty="0" err="1"/>
               <a:t>async</a:t>
             </a:r>
             <a:r>
-              <a:rPr lang="en-US" altLang="zh-CN" dirty="0" smtClean="0"/>
+              <a:rPr lang="en-US" altLang="zh-CN" dirty="0"/>
               <a:t> with ES5</a:t>
             </a:r>
             <a:endParaRPr lang="zh-CN" altLang="en-US" dirty="0"/>
@@ -4561,100 +4658,76 @@
           <a:p>
             <a:pPr fontAlgn="base"/>
             <a:r>
-              <a:rPr lang="en-US" altLang="zh-CN" dirty="0" err="1" smtClean="0"/>
+              <a:rPr lang="en-US" altLang="zh-CN" dirty="0" err="1"/>
               <a:t>babel</a:t>
             </a:r>
-            <a:endParaRPr lang="en-US" altLang="zh-CN" dirty="0" smtClean="0"/>
+            <a:endParaRPr lang="en-US" altLang="zh-CN" dirty="0"/>
           </a:p>
           <a:p>
             <a:pPr lvl="1" fontAlgn="base">
               <a:buNone/>
             </a:pPr>
             <a:r>
-              <a:rPr lang="en-US" altLang="zh-CN" sz="2400" dirty="0" err="1" smtClean="0"/>
+              <a:rPr lang="en-US" altLang="zh-CN" sz="2400" dirty="0" err="1"/>
               <a:t>babel</a:t>
             </a:r>
             <a:r>
-              <a:rPr lang="en-US" altLang="zh-CN" sz="2400" dirty="0" smtClean="0"/>
+              <a:rPr lang="en-US" altLang="zh-CN" sz="2400" dirty="0"/>
               <a:t>-preset-</a:t>
             </a:r>
             <a:r>
-              <a:rPr lang="en-US" altLang="zh-CN" sz="2400" dirty="0" err="1" smtClean="0"/>
+              <a:rPr lang="en-US" altLang="zh-CN" sz="2400" dirty="0" err="1"/>
               <a:t>env</a:t>
             </a:r>
-            <a:endParaRPr lang="en-US" altLang="zh-CN" sz="2400" dirty="0" smtClean="0"/>
+            <a:endParaRPr lang="en-US" altLang="zh-CN" sz="2400" dirty="0"/>
           </a:p>
           <a:p>
             <a:pPr lvl="1" fontAlgn="base">
               <a:buNone/>
             </a:pPr>
             <a:r>
-              <a:rPr lang="en-US" altLang="zh-CN" sz="2400" dirty="0" err="1" smtClean="0"/>
+              <a:rPr lang="en-US" altLang="zh-CN" sz="2400" dirty="0" err="1"/>
               <a:t>babel-polyfill</a:t>
             </a:r>
             <a:r>
-              <a:rPr lang="en-US" altLang="zh-CN" sz="2400" dirty="0" smtClean="0"/>
+              <a:rPr lang="en-US" altLang="zh-CN" sz="2400" dirty="0"/>
               <a:t>	</a:t>
             </a:r>
             <a:r>
-              <a:rPr lang="en-US" altLang="zh-CN" sz="2200" dirty="0" smtClean="0">
+              <a:rPr lang="en-US" altLang="zh-CN" sz="2200" dirty="0">
                 <a:hlinkClick r:id="rId2"/>
               </a:rPr>
-              <a:t>http</a:t>
-            </a:r>
-            <a:r>
-              <a:rPr lang="en-US" altLang="zh-CN" sz="2200" dirty="0" smtClean="0">
-                <a:hlinkClick r:id="rId2"/>
-              </a:rPr>
-              <a:t>://</a:t>
-            </a:r>
-            <a:r>
-              <a:rPr lang="en-US" altLang="zh-CN" sz="2200" dirty="0" smtClean="0">
-                <a:hlinkClick r:id="rId2"/>
-              </a:rPr>
-              <a:t>babeljs.io/docs/en/babel-polyfill</a:t>
-            </a:r>
-            <a:endParaRPr lang="en-US" altLang="zh-CN" dirty="0" smtClean="0"/>
+              <a:t>http://babeljs.io/docs/en/babel-polyfill</a:t>
+            </a:r>
+            <a:endParaRPr lang="en-US" altLang="zh-CN" dirty="0"/>
           </a:p>
           <a:p>
             <a:pPr fontAlgn="base"/>
             <a:r>
-              <a:rPr lang="en-US" altLang="zh-CN" dirty="0" err="1" smtClean="0"/>
+              <a:rPr lang="en-US" altLang="zh-CN" dirty="0" err="1"/>
               <a:t>webpack</a:t>
             </a:r>
-            <a:endParaRPr lang="en-US" altLang="zh-CN" dirty="0" smtClean="0"/>
+            <a:endParaRPr lang="en-US" altLang="zh-CN" dirty="0"/>
           </a:p>
           <a:p>
             <a:pPr lvl="1" fontAlgn="base">
               <a:buNone/>
             </a:pPr>
             <a:r>
-              <a:rPr lang="en-US" altLang="zh-CN" sz="2400" dirty="0" err="1" smtClean="0"/>
+              <a:rPr lang="en-US" altLang="zh-CN" sz="2400" dirty="0" err="1"/>
               <a:t>babel</a:t>
             </a:r>
             <a:r>
-              <a:rPr lang="en-US" altLang="zh-CN" sz="2400" dirty="0" smtClean="0"/>
+              <a:rPr lang="en-US" altLang="zh-CN" sz="2400" dirty="0"/>
               <a:t>-loader	</a:t>
             </a:r>
             <a:r>
-              <a:rPr lang="en-US" altLang="zh-CN" sz="2200" dirty="0" smtClean="0">
+              <a:rPr lang="en-US" altLang="zh-CN" sz="2200" dirty="0">
                 <a:hlinkClick r:id="rId3"/>
               </a:rPr>
-              <a:t>https</a:t>
-            </a:r>
-            <a:r>
-              <a:rPr lang="en-US" altLang="zh-CN" sz="2200" dirty="0" smtClean="0">
-                <a:hlinkClick r:id="rId3"/>
-              </a:rPr>
-              <a:t>://</a:t>
-            </a:r>
-            <a:r>
-              <a:rPr lang="en-US" altLang="zh-CN" sz="2200" dirty="0" smtClean="0">
-                <a:hlinkClick r:id="rId3"/>
-              </a:rPr>
-              <a:t>github.com/babel/babel-loader</a:t>
-            </a:r>
-            <a:endParaRPr lang="en-US" altLang="zh-CN" sz="2400" dirty="0" smtClean="0"/>
+              <a:t>https://github.com/babel/babel-loader</a:t>
+            </a:r>
+            <a:endParaRPr lang="en-US" altLang="zh-CN" sz="2400" dirty="0"/>
           </a:p>
           <a:p>
             <a:pPr marL="342900" lvl="1" indent="-342900" fontAlgn="base">
@@ -4665,52 +4738,40 @@
               <a:buChar char=""/>
             </a:pPr>
             <a:r>
-              <a:rPr lang="en-US" altLang="zh-CN" sz="3200" dirty="0" err="1" smtClean="0"/>
+              <a:rPr lang="en-US" altLang="zh-CN" sz="3200" dirty="0" err="1"/>
               <a:t>eslint</a:t>
             </a:r>
-            <a:endParaRPr lang="en-US" altLang="zh-CN" sz="3200" dirty="0" smtClean="0"/>
+            <a:endParaRPr lang="en-US" altLang="zh-CN" sz="3200" dirty="0"/>
           </a:p>
           <a:p>
             <a:pPr marL="742950" lvl="2" indent="-342900" fontAlgn="base">
               <a:buNone/>
             </a:pPr>
             <a:r>
-              <a:rPr lang="en-US" altLang="zh-CN" dirty="0" err="1" smtClean="0"/>
+              <a:rPr lang="en-US" altLang="zh-CN" dirty="0" err="1"/>
               <a:t>ecmaVersion</a:t>
             </a:r>
             <a:r>
-              <a:rPr lang="en-US" altLang="zh-CN" dirty="0" smtClean="0"/>
+              <a:rPr lang="en-US" altLang="zh-CN" dirty="0"/>
               <a:t>	</a:t>
             </a:r>
             <a:r>
-              <a:rPr lang="en-US" altLang="zh-CN" sz="2200" dirty="0" smtClean="0">
+              <a:rPr lang="en-US" altLang="zh-CN" sz="2200" dirty="0">
                 <a:hlinkClick r:id="rId4"/>
               </a:rPr>
-              <a:t>https</a:t>
-            </a:r>
-            <a:r>
-              <a:rPr lang="en-US" altLang="zh-CN" sz="2200" dirty="0" smtClean="0">
-                <a:hlinkClick r:id="rId4"/>
-              </a:rPr>
-              <a:t>://</a:t>
-            </a:r>
-            <a:r>
-              <a:rPr lang="en-US" altLang="zh-CN" sz="2200" dirty="0" smtClean="0">
-                <a:hlinkClick r:id="rId4"/>
-              </a:rPr>
-              <a:t>eslint.org/docs/user-guide/configuring</a:t>
-            </a:r>
-            <a:endParaRPr lang="en-US" altLang="zh-CN" dirty="0" smtClean="0"/>
+              <a:t>https://eslint.org/docs/user-guide/configuring</a:t>
+            </a:r>
+            <a:endParaRPr lang="en-US" altLang="zh-CN" dirty="0"/>
           </a:p>
           <a:p>
             <a:pPr marL="742950" lvl="2" indent="-342900" fontAlgn="base"/>
-            <a:endParaRPr lang="en-US" altLang="zh-CN" dirty="0" smtClean="0"/>
+            <a:endParaRPr lang="en-US" altLang="zh-CN" dirty="0"/>
           </a:p>
           <a:p>
             <a:pPr lvl="1" fontAlgn="base">
               <a:buNone/>
             </a:pPr>
-            <a:endParaRPr lang="en-US" altLang="zh-CN" dirty="0" smtClean="0"/>
+            <a:endParaRPr lang="en-US" altLang="zh-CN" dirty="0"/>
           </a:p>
         </p:txBody>
       </p:sp>
@@ -4731,7 +4792,7 @@
         </p:blipFill>
         <p:spPr bwMode="auto">
           <a:xfrm>
-            <a:off x="827584" y="1484784"/>
+            <a:off x="827584" y="1599828"/>
             <a:ext cx="7429500" cy="1181100"/>
           </a:xfrm>
           <a:prstGeom prst="rect">
@@ -4787,15 +4848,15 @@
           <a:lstStyle/>
           <a:p>
             <a:r>
-              <a:rPr lang="en-US" altLang="zh-CN" dirty="0" err="1" smtClean="0"/>
+              <a:rPr lang="en-US" altLang="zh-CN" dirty="0" err="1"/>
               <a:t>async</a:t>
             </a:r>
             <a:r>
-              <a:rPr lang="en-US" altLang="zh-CN" dirty="0" smtClean="0"/>
+              <a:rPr lang="en-US" altLang="zh-CN" dirty="0"/>
               <a:t> in </a:t>
             </a:r>
             <a:r>
-              <a:rPr lang="en-US" altLang="zh-CN" dirty="0" err="1" smtClean="0"/>
+              <a:rPr lang="en-US" altLang="zh-CN" dirty="0" err="1"/>
               <a:t>angularJS</a:t>
             </a:r>
             <a:endParaRPr lang="zh-CN" altLang="en-US" dirty="0"/>
@@ -4823,25 +4884,16 @@
           <a:lstStyle/>
           <a:p>
             <a:r>
-              <a:rPr lang="en-US" altLang="zh-CN" dirty="0" smtClean="0"/>
-              <a:t>$q is </a:t>
-            </a:r>
-            <a:r>
-              <a:rPr lang="en-US" altLang="zh-CN" dirty="0" smtClean="0"/>
-              <a:t>a </a:t>
-            </a:r>
-            <a:r>
-              <a:rPr lang="en-US" altLang="zh-CN" dirty="0" smtClean="0"/>
-              <a:t>Promises/A+ compliant implementation</a:t>
-            </a:r>
-            <a:endParaRPr lang="en-US" altLang="zh-CN" dirty="0" smtClean="0"/>
-          </a:p>
-          <a:p>
-            <a:endParaRPr lang="en-US" altLang="zh-CN" dirty="0" smtClean="0"/>
-          </a:p>
-          <a:p>
-            <a:r>
-              <a:rPr lang="en-US" altLang="zh-CN" dirty="0" smtClean="0">
+              <a:rPr lang="en-US" altLang="zh-CN" dirty="0"/>
+              <a:t>$q is a Promises/A+ compliant implementation</a:t>
+            </a:r>
+          </a:p>
+          <a:p>
+            <a:endParaRPr lang="en-US" altLang="zh-CN" dirty="0"/>
+          </a:p>
+          <a:p>
+            <a:r>
+              <a:rPr lang="en-US" altLang="zh-CN" dirty="0">
                 <a:solidFill>
                   <a:srgbClr val="FF0000"/>
                 </a:solidFill>
@@ -4849,7 +4901,7 @@
               <a:t>different</a:t>
             </a:r>
             <a:r>
-              <a:rPr lang="en-US" altLang="zh-CN" dirty="0" smtClean="0"/>
+              <a:rPr lang="en-US" altLang="zh-CN" dirty="0"/>
               <a:t> from promise in ES6</a:t>
             </a:r>
           </a:p>
@@ -4858,7 +4910,7 @@
               <a:buNone/>
             </a:pPr>
             <a:r>
-              <a:rPr lang="en-US" altLang="zh-CN" dirty="0" smtClean="0">
+              <a:rPr lang="en-US" altLang="zh-CN" dirty="0">
                 <a:solidFill>
                   <a:srgbClr val="24292E"/>
                 </a:solidFill>
@@ -4867,7 +4919,7 @@
               <a:t>$</a:t>
             </a:r>
             <a:r>
-              <a:rPr lang="en-US" altLang="zh-CN" dirty="0" err="1" smtClean="0">
+              <a:rPr lang="en-US" altLang="zh-CN" dirty="0" err="1">
                 <a:solidFill>
                   <a:srgbClr val="24292E"/>
                 </a:solidFill>
@@ -4876,7 +4928,7 @@
               <a:t>rootScope.</a:t>
             </a:r>
             <a:r>
-              <a:rPr lang="en-US" altLang="zh-CN" dirty="0" err="1" smtClean="0">
+              <a:rPr lang="en-US" altLang="zh-CN" dirty="0" err="1">
                 <a:solidFill>
                   <a:srgbClr val="6F42C1"/>
                 </a:solidFill>
@@ -4885,22 +4937,13 @@
               <a:t>$evalAsync</a:t>
             </a:r>
             <a:r>
-              <a:rPr lang="en-US" altLang="zh-CN" dirty="0" smtClean="0">
+              <a:rPr lang="en-US" altLang="zh-CN" dirty="0">
                 <a:solidFill>
                   <a:srgbClr val="24292E"/>
                 </a:solidFill>
                 <a:latin typeface="SFMono-Regular"/>
               </a:rPr>
-              <a:t>(callback</a:t>
-            </a:r>
-            <a:r>
-              <a:rPr lang="en-US" altLang="zh-CN" dirty="0" smtClean="0">
-                <a:solidFill>
-                  <a:srgbClr val="24292E"/>
-                </a:solidFill>
-                <a:latin typeface="SFMono-Regular"/>
-              </a:rPr>
-              <a:t>)</a:t>
+              <a:t>(callback)</a:t>
             </a:r>
             <a:endParaRPr lang="zh-CN" altLang="en-US" dirty="0"/>
           </a:p>
@@ -4975,19 +5018,19 @@
           <a:lstStyle/>
           <a:p>
             <a:r>
-              <a:rPr lang="en-US" altLang="zh-CN" dirty="0" err="1" smtClean="0"/>
+              <a:rPr lang="en-US" altLang="zh-CN" dirty="0" err="1"/>
               <a:t>async</a:t>
             </a:r>
             <a:r>
-              <a:rPr lang="en-US" altLang="zh-CN" dirty="0" smtClean="0"/>
+              <a:rPr lang="en-US" altLang="zh-CN" dirty="0"/>
               <a:t> in </a:t>
             </a:r>
             <a:r>
-              <a:rPr lang="en-US" altLang="zh-CN" dirty="0" err="1" smtClean="0"/>
+              <a:rPr lang="en-US" altLang="zh-CN" dirty="0" err="1"/>
               <a:t>angularJS</a:t>
             </a:r>
             <a:r>
-              <a:rPr lang="en-US" altLang="zh-CN" dirty="0" smtClean="0"/>
+              <a:rPr lang="en-US" altLang="zh-CN" dirty="0"/>
               <a:t> (cont.)</a:t>
             </a:r>
             <a:endParaRPr lang="zh-CN" altLang="en-US" dirty="0"/>
@@ -5010,48 +5053,36 @@
           <a:lstStyle/>
           <a:p>
             <a:r>
-              <a:rPr lang="en-US" altLang="zh-CN" dirty="0" smtClean="0"/>
+              <a:rPr lang="en-US" altLang="zh-CN" dirty="0"/>
               <a:t>make sure </a:t>
             </a:r>
             <a:r>
-              <a:rPr lang="en-US" altLang="zh-CN" dirty="0" err="1" smtClean="0"/>
+              <a:rPr lang="en-US" altLang="zh-CN" dirty="0" err="1"/>
               <a:t>scope.$digest</a:t>
             </a:r>
             <a:r>
-              <a:rPr lang="en-US" altLang="zh-CN" dirty="0" smtClean="0"/>
+              <a:rPr lang="en-US" altLang="zh-CN" dirty="0"/>
               <a:t>() is called in the end of </a:t>
             </a:r>
             <a:r>
-              <a:rPr lang="en-US" altLang="zh-CN" dirty="0" err="1" smtClean="0"/>
+              <a:rPr lang="en-US" altLang="zh-CN" dirty="0" err="1"/>
               <a:t>async</a:t>
             </a:r>
             <a:r>
-              <a:rPr lang="en-US" altLang="zh-CN" dirty="0" smtClean="0"/>
+              <a:rPr lang="en-US" altLang="zh-CN" dirty="0"/>
               <a:t> calls</a:t>
             </a:r>
           </a:p>
           <a:p>
             <a:r>
-              <a:rPr lang="en-US" altLang="zh-CN" dirty="0" smtClean="0"/>
+              <a:rPr lang="en-US" altLang="zh-CN" dirty="0"/>
               <a:t>wrap in decorator </a:t>
             </a:r>
             <a:r>
-              <a:rPr lang="en-US" altLang="zh-CN" dirty="0" smtClean="0">
+              <a:rPr lang="en-US" altLang="zh-CN" dirty="0">
                 <a:hlinkClick r:id="rId2"/>
               </a:rPr>
-              <a:t>https</a:t>
-            </a:r>
-            <a:r>
-              <a:rPr lang="en-US" altLang="zh-CN" dirty="0" smtClean="0">
-                <a:hlinkClick r:id="rId2"/>
-              </a:rPr>
-              <a:t>://medium.com/@</a:t>
-            </a:r>
-            <a:r>
-              <a:rPr lang="en-US" altLang="zh-CN" dirty="0" smtClean="0">
-                <a:hlinkClick r:id="rId2"/>
-              </a:rPr>
-              <a:t>alSkachkov/using-async-await-function-in-angular-1-5-babel-6-387f7c43948c</a:t>
+              <a:t>https://medium.com/@alSkachkov/using-async-await-function-in-angular-1-5-babel-6-387f7c43948c</a:t>
             </a:r>
             <a:endParaRPr lang="zh-CN" altLang="en-US" dirty="0"/>
           </a:p>

</xml_diff>